<commit_message>
add shadow to text
</commit_message>
<xml_diff>
--- a/Ethik/RoboterEthik.pptx
+++ b/Ethik/RoboterEthik.pptx
@@ -110,6 +110,11 @@
       </a:defRPr>
     </a:lvl9pPr>
   </p:defaultTextStyle>
+  <p:extLst>
+    <p:ext uri="{EFAFB233-063F-42B5-8137-9DF3F51BA10A}">
+      <p15:sldGuideLst xmlns:p15="http://schemas.microsoft.com/office/powerpoint/2012/main"/>
+    </p:ext>
+  </p:extLst>
 </p:presentation>
 </file>
 
@@ -426,7 +431,7 @@
           <a:p>
             <a:fld id="{1E351CED-465B-40B5-ADCE-957C918F227B}" type="datetimeFigureOut">
               <a:rPr lang="en-US" smtClean="0"/>
-              <a:t>2/26/2024</a:t>
+              <a:t>3/11/2024</a:t>
             </a:fld>
             <a:endParaRPr lang="en-US"/>
           </a:p>
@@ -634,7 +639,7 @@
           <a:p>
             <a:fld id="{1E351CED-465B-40B5-ADCE-957C918F227B}" type="datetimeFigureOut">
               <a:rPr lang="en-US" smtClean="0"/>
-              <a:t>2/26/2024</a:t>
+              <a:t>3/11/2024</a:t>
             </a:fld>
             <a:endParaRPr lang="en-US"/>
           </a:p>
@@ -844,7 +849,7 @@
           <a:p>
             <a:fld id="{1E351CED-465B-40B5-ADCE-957C918F227B}" type="datetimeFigureOut">
               <a:rPr lang="en-US" smtClean="0"/>
-              <a:t>2/26/2024</a:t>
+              <a:t>3/11/2024</a:t>
             </a:fld>
             <a:endParaRPr lang="en-US"/>
           </a:p>
@@ -1044,7 +1049,7 @@
           <a:p>
             <a:fld id="{1E351CED-465B-40B5-ADCE-957C918F227B}" type="datetimeFigureOut">
               <a:rPr lang="en-US" smtClean="0"/>
-              <a:t>2/26/2024</a:t>
+              <a:t>3/11/2024</a:t>
             </a:fld>
             <a:endParaRPr lang="en-US"/>
           </a:p>
@@ -1622,7 +1627,7 @@
           <a:p>
             <a:fld id="{1E351CED-465B-40B5-ADCE-957C918F227B}" type="datetimeFigureOut">
               <a:rPr lang="en-US" smtClean="0"/>
-              <a:t>2/26/2024</a:t>
+              <a:t>3/11/2024</a:t>
             </a:fld>
             <a:endParaRPr lang="en-US"/>
           </a:p>
@@ -1895,7 +1900,7 @@
           <a:p>
             <a:fld id="{1E351CED-465B-40B5-ADCE-957C918F227B}" type="datetimeFigureOut">
               <a:rPr lang="en-US" smtClean="0"/>
-              <a:t>2/26/2024</a:t>
+              <a:t>3/11/2024</a:t>
             </a:fld>
             <a:endParaRPr lang="en-US"/>
           </a:p>
@@ -2312,7 +2317,7 @@
           <a:p>
             <a:fld id="{1E351CED-465B-40B5-ADCE-957C918F227B}" type="datetimeFigureOut">
               <a:rPr lang="en-US" smtClean="0"/>
-              <a:t>2/26/2024</a:t>
+              <a:t>3/11/2024</a:t>
             </a:fld>
             <a:endParaRPr lang="en-US"/>
           </a:p>
@@ -2459,7 +2464,7 @@
           <a:p>
             <a:fld id="{1E351CED-465B-40B5-ADCE-957C918F227B}" type="datetimeFigureOut">
               <a:rPr lang="en-US" smtClean="0"/>
-              <a:t>2/26/2024</a:t>
+              <a:t>3/11/2024</a:t>
             </a:fld>
             <a:endParaRPr lang="en-US"/>
           </a:p>
@@ -2572,7 +2577,7 @@
           <a:p>
             <a:fld id="{1E351CED-465B-40B5-ADCE-957C918F227B}" type="datetimeFigureOut">
               <a:rPr lang="en-US" smtClean="0"/>
-              <a:t>2/26/2024</a:t>
+              <a:t>3/11/2024</a:t>
             </a:fld>
             <a:endParaRPr lang="en-US"/>
           </a:p>
@@ -2887,7 +2892,7 @@
           <a:p>
             <a:fld id="{1E351CED-465B-40B5-ADCE-957C918F227B}" type="datetimeFigureOut">
               <a:rPr lang="en-US" smtClean="0"/>
-              <a:t>2/26/2024</a:t>
+              <a:t>3/11/2024</a:t>
             </a:fld>
             <a:endParaRPr lang="en-US"/>
           </a:p>
@@ -3181,7 +3186,7 @@
           <a:p>
             <a:fld id="{1E351CED-465B-40B5-ADCE-957C918F227B}" type="datetimeFigureOut">
               <a:rPr lang="en-US" smtClean="0"/>
-              <a:t>2/26/2024</a:t>
+              <a:t>3/11/2024</a:t>
             </a:fld>
             <a:endParaRPr lang="en-US"/>
           </a:p>
@@ -3422,7 +3427,7 @@
           <a:p>
             <a:fld id="{1E351CED-465B-40B5-ADCE-957C918F227B}" type="datetimeFigureOut">
               <a:rPr lang="en-US" smtClean="0"/>
-              <a:t>2/26/2024</a:t>
+              <a:t>3/11/2024</a:t>
             </a:fld>
             <a:endParaRPr lang="en-US"/>
           </a:p>
@@ -5189,6 +5194,13 @@
                 <a:solidFill>
                   <a:srgbClr val="FFFFFF"/>
                 </a:solidFill>
+                <a:effectLst>
+                  <a:outerShdw blurRad="38100" dist="38100" dir="2700000" algn="tl">
+                    <a:srgbClr val="000000">
+                      <a:alpha val="43137"/>
+                    </a:srgbClr>
+                  </a:outerShdw>
+                </a:effectLst>
               </a:rPr>
               <a:t>Boston Dynamics </a:t>
             </a:r>
@@ -5197,6 +5209,13 @@
                 <a:solidFill>
                   <a:srgbClr val="FFFFFF"/>
                 </a:solidFill>
+                <a:effectLst>
+                  <a:outerShdw blurRad="38100" dist="38100" dir="2700000" algn="tl">
+                    <a:srgbClr val="000000">
+                      <a:alpha val="43137"/>
+                    </a:srgbClr>
+                  </a:outerShdw>
+                </a:effectLst>
               </a:rPr>
               <a:t>MilitärroboterFunktion</a:t>
             </a:r>
@@ -5205,6 +5224,13 @@
                 <a:solidFill>
                   <a:srgbClr val="FFFFFF"/>
                 </a:solidFill>
+                <a:effectLst>
+                  <a:outerShdw blurRad="38100" dist="38100" dir="2700000" algn="tl">
+                    <a:srgbClr val="000000">
+                      <a:alpha val="43137"/>
+                    </a:srgbClr>
+                  </a:outerShdw>
+                </a:effectLst>
               </a:rPr>
               <a:t>: Vielseitige vierbeinige Roboter, entwickelt für verschiedene Anwendungen, einschließlich militärischer und ziviler Einsätze.</a:t>
             </a:r>
@@ -5222,6 +5248,13 @@
                 <a:solidFill>
                   <a:srgbClr val="FFFFFF"/>
                 </a:solidFill>
+                <a:effectLst>
+                  <a:outerShdw blurRad="38100" dist="38100" dir="2700000" algn="tl">
+                    <a:srgbClr val="000000">
+                      <a:alpha val="43137"/>
+                    </a:srgbClr>
+                  </a:outerShdw>
+                </a:effectLst>
               </a:rPr>
               <a:t>Merkmale</a:t>
             </a:r>
@@ -5230,6 +5263,13 @@
                 <a:solidFill>
                   <a:srgbClr val="FFFFFF"/>
                 </a:solidFill>
+                <a:effectLst>
+                  <a:outerShdw blurRad="38100" dist="38100" dir="2700000" algn="tl">
+                    <a:srgbClr val="000000">
+                      <a:alpha val="43137"/>
+                    </a:srgbClr>
+                  </a:outerShdw>
+                </a:effectLst>
               </a:rPr>
               <a:t>:</a:t>
             </a:r>
@@ -5247,6 +5287,13 @@
                 <a:solidFill>
                   <a:srgbClr val="FFFFFF"/>
                 </a:solidFill>
+                <a:effectLst>
+                  <a:outerShdw blurRad="38100" dist="38100" dir="2700000" algn="tl">
+                    <a:srgbClr val="000000">
+                      <a:alpha val="43137"/>
+                    </a:srgbClr>
+                  </a:outerShdw>
+                </a:effectLst>
               </a:rPr>
               <a:t>Bewegungsfähigkeit: Stabile Fortbewegung in verschiedenen Geländen dank vierbeiniger Konstruktion.</a:t>
             </a:r>
@@ -5264,6 +5311,13 @@
                 <a:solidFill>
                   <a:srgbClr val="FFFFFF"/>
                 </a:solidFill>
+                <a:effectLst>
+                  <a:outerShdw blurRad="38100" dist="38100" dir="2700000" algn="tl">
+                    <a:srgbClr val="000000">
+                      <a:alpha val="43137"/>
+                    </a:srgbClr>
+                  </a:outerShdw>
+                </a:effectLst>
               </a:rPr>
               <a:t>Sensorik: Ausgestattet mit Kameras, Lidar, Infrarot- und Ultraschallsensoren für Umgebungswahrnehmung.</a:t>
             </a:r>
@@ -5281,6 +5335,13 @@
                 <a:solidFill>
                   <a:srgbClr val="FFFFFF"/>
                 </a:solidFill>
+                <a:effectLst>
+                  <a:outerShdw blurRad="38100" dist="38100" dir="2700000" algn="tl">
+                    <a:srgbClr val="000000">
+                      <a:alpha val="43137"/>
+                    </a:srgbClr>
+                  </a:outerShdw>
+                </a:effectLst>
               </a:rPr>
               <a:t>Künstliche Intelligenz: Verarbeitung von Sensordaten und autonome Entscheidungsfindung.</a:t>
             </a:r>
@@ -5298,6 +5359,13 @@
                 <a:solidFill>
                   <a:srgbClr val="FFFFFF"/>
                 </a:solidFill>
+                <a:effectLst>
+                  <a:outerShdw blurRad="38100" dist="38100" dir="2700000" algn="tl">
+                    <a:srgbClr val="000000">
+                      <a:alpha val="43137"/>
+                    </a:srgbClr>
+                  </a:outerShdw>
+                </a:effectLst>
               </a:rPr>
               <a:t>Anpassungsfähigkeit: Konfigurierbar für verschiedene Aufgaben je nach Anforderungen des Einsatzes.</a:t>
             </a:r>
@@ -5315,6 +5383,13 @@
                 <a:solidFill>
                   <a:srgbClr val="FFFFFF"/>
                 </a:solidFill>
+                <a:effectLst>
+                  <a:outerShdw blurRad="38100" dist="38100" dir="2700000" algn="tl">
+                    <a:srgbClr val="000000">
+                      <a:alpha val="43137"/>
+                    </a:srgbClr>
+                  </a:outerShdw>
+                </a:effectLst>
               </a:rPr>
               <a:t>Interaktion mit der Umgebung: Manipulation von Objekten und Durchführung einfacher physischer Aufgaben.</a:t>
             </a:r>
@@ -5332,6 +5407,13 @@
                 <a:solidFill>
                   <a:srgbClr val="FFFFFF"/>
                 </a:solidFill>
+                <a:effectLst>
+                  <a:outerShdw blurRad="38100" dist="38100" dir="2700000" algn="tl">
+                    <a:srgbClr val="000000">
+                      <a:alpha val="43137"/>
+                    </a:srgbClr>
+                  </a:outerShdw>
+                </a:effectLst>
               </a:rPr>
               <a:t>Anwendungen im Militär</a:t>
             </a:r>
@@ -5340,6 +5422,13 @@
                 <a:solidFill>
                   <a:srgbClr val="FFFFFF"/>
                 </a:solidFill>
+                <a:effectLst>
+                  <a:outerShdw blurRad="38100" dist="38100" dir="2700000" algn="tl">
+                    <a:srgbClr val="000000">
+                      <a:alpha val="43137"/>
+                    </a:srgbClr>
+                  </a:outerShdw>
+                </a:effectLst>
               </a:rPr>
               <a:t>:</a:t>
             </a:r>
@@ -5357,6 +5446,13 @@
                 <a:solidFill>
                   <a:srgbClr val="FFFFFF"/>
                 </a:solidFill>
+                <a:effectLst>
+                  <a:outerShdw blurRad="38100" dist="38100" dir="2700000" algn="tl">
+                    <a:srgbClr val="000000">
+                      <a:alpha val="43137"/>
+                    </a:srgbClr>
+                  </a:outerShdw>
+                </a:effectLst>
               </a:rPr>
               <a:t>Überwachung und Aufklärung.</a:t>
             </a:r>
@@ -5374,6 +5470,13 @@
                 <a:solidFill>
                   <a:srgbClr val="FFFFFF"/>
                 </a:solidFill>
+                <a:effectLst>
+                  <a:outerShdw blurRad="38100" dist="38100" dir="2700000" algn="tl">
+                    <a:srgbClr val="000000">
+                      <a:alpha val="43137"/>
+                    </a:srgbClr>
+                  </a:outerShdw>
+                </a:effectLst>
               </a:rPr>
               <a:t>Patrouillen und Sicherheitsüberwachung.</a:t>
             </a:r>
@@ -5391,6 +5494,13 @@
                 <a:solidFill>
                   <a:srgbClr val="FFFFFF"/>
                 </a:solidFill>
+                <a:effectLst>
+                  <a:outerShdw blurRad="38100" dist="38100" dir="2700000" algn="tl">
+                    <a:srgbClr val="000000">
+                      <a:alpha val="43137"/>
+                    </a:srgbClr>
+                  </a:outerShdw>
+                </a:effectLst>
               </a:rPr>
               <a:t>Logistikunterstützung und Transport.</a:t>
             </a:r>
@@ -5408,6 +5518,13 @@
                 <a:solidFill>
                   <a:srgbClr val="FFFFFF"/>
                 </a:solidFill>
+                <a:effectLst>
+                  <a:outerShdw blurRad="38100" dist="38100" dir="2700000" algn="tl">
+                    <a:srgbClr val="000000">
+                      <a:alpha val="43137"/>
+                    </a:srgbClr>
+                  </a:outerShdw>
+                </a:effectLst>
               </a:rPr>
               <a:t>Gefahrenabwehr und Rettungseinsätze.</a:t>
             </a:r>
@@ -5422,6 +5539,13 @@
               <a:solidFill>
                 <a:srgbClr val="FFFFFF"/>
               </a:solidFill>
+              <a:effectLst>
+                <a:outerShdw blurRad="38100" dist="38100" dir="2700000" algn="tl">
+                  <a:srgbClr val="000000">
+                    <a:alpha val="43137"/>
+                  </a:srgbClr>
+                </a:outerShdw>
+              </a:effectLst>
             </a:endParaRPr>
           </a:p>
         </p:txBody>
@@ -5678,6 +5802,13 @@
                 <a:solidFill>
                   <a:schemeClr val="bg1"/>
                 </a:solidFill>
+                <a:effectLst>
+                  <a:outerShdw blurRad="38100" dist="38100" dir="2700000" algn="tl">
+                    <a:srgbClr val="000000">
+                      <a:alpha val="43137"/>
+                    </a:srgbClr>
+                  </a:outerShdw>
+                </a:effectLst>
               </a:rPr>
               <a:t>Militärroboter: Vor- und Nachteile sowie Auswirkungen</a:t>
             </a:r>
@@ -5685,6 +5816,13 @@
               <a:solidFill>
                 <a:schemeClr val="bg1"/>
               </a:solidFill>
+              <a:effectLst>
+                <a:outerShdw blurRad="38100" dist="38100" dir="2700000" algn="tl">
+                  <a:srgbClr val="000000">
+                    <a:alpha val="43137"/>
+                  </a:srgbClr>
+                </a:outerShdw>
+              </a:effectLst>
             </a:endParaRPr>
           </a:p>
           <a:p>
@@ -5693,6 +5831,13 @@
                 <a:solidFill>
                   <a:schemeClr val="bg1"/>
                 </a:solidFill>
+                <a:effectLst>
+                  <a:outerShdw blurRad="38100" dist="38100" dir="2700000" algn="tl">
+                    <a:srgbClr val="000000">
+                      <a:alpha val="43137"/>
+                    </a:srgbClr>
+                  </a:outerShdw>
+                </a:effectLst>
               </a:rPr>
               <a:t>Vorteile:</a:t>
             </a:r>
@@ -5700,6 +5845,13 @@
               <a:solidFill>
                 <a:schemeClr val="bg1"/>
               </a:solidFill>
+              <a:effectLst>
+                <a:outerShdw blurRad="38100" dist="38100" dir="2700000" algn="tl">
+                  <a:srgbClr val="000000">
+                    <a:alpha val="43137"/>
+                  </a:srgbClr>
+                </a:outerShdw>
+              </a:effectLst>
             </a:endParaRPr>
           </a:p>
           <a:p>
@@ -5712,6 +5864,13 @@
                 <a:solidFill>
                   <a:schemeClr val="bg1"/>
                 </a:solidFill>
+                <a:effectLst>
+                  <a:outerShdw blurRad="38100" dist="38100" dir="2700000" algn="tl">
+                    <a:srgbClr val="000000">
+                      <a:alpha val="43137"/>
+                    </a:srgbClr>
+                  </a:outerShdw>
+                </a:effectLst>
               </a:rPr>
               <a:t>Reduzierung menschlicher Risiken</a:t>
             </a:r>
@@ -5720,6 +5879,13 @@
                 <a:solidFill>
                   <a:schemeClr val="bg1"/>
                 </a:solidFill>
+                <a:effectLst>
+                  <a:outerShdw blurRad="38100" dist="38100" dir="2700000" algn="tl">
+                    <a:srgbClr val="000000">
+                      <a:alpha val="43137"/>
+                    </a:srgbClr>
+                  </a:outerShdw>
+                </a:effectLst>
               </a:rPr>
               <a:t>: Einsatz von Robotern für gefährliche Aufgaben schützt Soldaten vor direkter Bedrohung.</a:t>
             </a:r>
@@ -5734,6 +5900,13 @@
                 <a:solidFill>
                   <a:schemeClr val="bg1"/>
                 </a:solidFill>
+                <a:effectLst>
+                  <a:outerShdw blurRad="38100" dist="38100" dir="2700000" algn="tl">
+                    <a:srgbClr val="000000">
+                      <a:alpha val="43137"/>
+                    </a:srgbClr>
+                  </a:outerShdw>
+                </a:effectLst>
               </a:rPr>
               <a:t>Präzision und Effektivität</a:t>
             </a:r>
@@ -5742,6 +5915,13 @@
                 <a:solidFill>
                   <a:schemeClr val="bg1"/>
                 </a:solidFill>
+                <a:effectLst>
+                  <a:outerShdw blurRad="38100" dist="38100" dir="2700000" algn="tl">
+                    <a:srgbClr val="000000">
+                      <a:alpha val="43137"/>
+                    </a:srgbClr>
+                  </a:outerShdw>
+                </a:effectLst>
               </a:rPr>
               <a:t>: Roboter können Aufgaben mit höherer Genauigkeit und Effizienz ausführen als Menschen.</a:t>
             </a:r>
@@ -5756,6 +5936,13 @@
                 <a:solidFill>
                   <a:schemeClr val="bg1"/>
                 </a:solidFill>
+                <a:effectLst>
+                  <a:outerShdw blurRad="38100" dist="38100" dir="2700000" algn="tl">
+                    <a:srgbClr val="000000">
+                      <a:alpha val="43137"/>
+                    </a:srgbClr>
+                  </a:outerShdw>
+                </a:effectLst>
               </a:rPr>
               <a:t>Permanente Einsatzbereitschaft</a:t>
             </a:r>
@@ -5764,6 +5951,13 @@
                 <a:solidFill>
                   <a:schemeClr val="bg1"/>
                 </a:solidFill>
+                <a:effectLst>
+                  <a:outerShdw blurRad="38100" dist="38100" dir="2700000" algn="tl">
+                    <a:srgbClr val="000000">
+                      <a:alpha val="43137"/>
+                    </a:srgbClr>
+                  </a:outerShdw>
+                </a:effectLst>
               </a:rPr>
               <a:t>: Im Gegensatz zu menschlichen Soldaten sind Roboter unempfindlich gegenüber Erschöpfung und können kontinuierlich im Einsatz bleiben.</a:t>
             </a:r>
@@ -5778,6 +5972,13 @@
                 <a:solidFill>
                   <a:schemeClr val="bg1"/>
                 </a:solidFill>
+                <a:effectLst>
+                  <a:outerShdw blurRad="38100" dist="38100" dir="2700000" algn="tl">
+                    <a:srgbClr val="000000">
+                      <a:alpha val="43137"/>
+                    </a:srgbClr>
+                  </a:outerShdw>
+                </a:effectLst>
               </a:rPr>
               <a:t>Skalierbarkeit</a:t>
             </a:r>
@@ -5786,6 +5987,13 @@
                 <a:solidFill>
                   <a:schemeClr val="bg1"/>
                 </a:solidFill>
+                <a:effectLst>
+                  <a:outerShdw blurRad="38100" dist="38100" dir="2700000" algn="tl">
+                    <a:srgbClr val="000000">
+                      <a:alpha val="43137"/>
+                    </a:srgbClr>
+                  </a:outerShdw>
+                </a:effectLst>
               </a:rPr>
               <a:t>: Roboter können in großen Mengen hergestellt und eingesetzt werden, was eine schnelle Reaktion auf verschiedene Bedrohungen ermöglicht.</a:t>
             </a:r>
@@ -5796,6 +6004,13 @@
                 <a:solidFill>
                   <a:schemeClr val="bg1"/>
                 </a:solidFill>
+                <a:effectLst>
+                  <a:outerShdw blurRad="38100" dist="38100" dir="2700000" algn="tl">
+                    <a:srgbClr val="000000">
+                      <a:alpha val="43137"/>
+                    </a:srgbClr>
+                  </a:outerShdw>
+                </a:effectLst>
               </a:rPr>
               <a:t>Nachteile:</a:t>
             </a:r>
@@ -5803,6 +6018,13 @@
               <a:solidFill>
                 <a:schemeClr val="bg1"/>
               </a:solidFill>
+              <a:effectLst>
+                <a:outerShdw blurRad="38100" dist="38100" dir="2700000" algn="tl">
+                  <a:srgbClr val="000000">
+                    <a:alpha val="43137"/>
+                  </a:srgbClr>
+                </a:outerShdw>
+              </a:effectLst>
             </a:endParaRPr>
           </a:p>
           <a:p>
@@ -5815,6 +6037,13 @@
                 <a:solidFill>
                   <a:schemeClr val="bg1"/>
                 </a:solidFill>
+                <a:effectLst>
+                  <a:outerShdw blurRad="38100" dist="38100" dir="2700000" algn="tl">
+                    <a:srgbClr val="000000">
+                      <a:alpha val="43137"/>
+                    </a:srgbClr>
+                  </a:outerShdw>
+                </a:effectLst>
               </a:rPr>
               <a:t>Ethik und Rechtsfragen</a:t>
             </a:r>
@@ -5823,6 +6052,13 @@
                 <a:solidFill>
                   <a:schemeClr val="bg1"/>
                 </a:solidFill>
+                <a:effectLst>
+                  <a:outerShdw blurRad="38100" dist="38100" dir="2700000" algn="tl">
+                    <a:srgbClr val="000000">
+                      <a:alpha val="43137"/>
+                    </a:srgbClr>
+                  </a:outerShdw>
+                </a:effectLst>
               </a:rPr>
               <a:t>: Die Verwendung von autonomen Waffensystemen wirft Fragen hinsichtlich ethischer Standards und internationaler Gesetze auf.</a:t>
             </a:r>
@@ -5837,6 +6073,13 @@
                 <a:solidFill>
                   <a:schemeClr val="bg1"/>
                 </a:solidFill>
+                <a:effectLst>
+                  <a:outerShdw blurRad="38100" dist="38100" dir="2700000" algn="tl">
+                    <a:srgbClr val="000000">
+                      <a:alpha val="43137"/>
+                    </a:srgbClr>
+                  </a:outerShdw>
+                </a:effectLst>
               </a:rPr>
               <a:t>Fehlende Empathie und Unterscheidungsvermögen</a:t>
             </a:r>
@@ -5845,6 +6088,13 @@
                 <a:solidFill>
                   <a:schemeClr val="bg1"/>
                 </a:solidFill>
+                <a:effectLst>
+                  <a:outerShdw blurRad="38100" dist="38100" dir="2700000" algn="tl">
+                    <a:srgbClr val="000000">
+                      <a:alpha val="43137"/>
+                    </a:srgbClr>
+                  </a:outerShdw>
+                </a:effectLst>
               </a:rPr>
               <a:t>: Roboter fehlt die menschliche Fähigkeit zur Empathie und zum Erkennen komplexer Situationen.</a:t>
             </a:r>
@@ -5859,6 +6109,13 @@
                 <a:solidFill>
                   <a:schemeClr val="bg1"/>
                 </a:solidFill>
+                <a:effectLst>
+                  <a:outerShdw blurRad="38100" dist="38100" dir="2700000" algn="tl">
+                    <a:srgbClr val="000000">
+                      <a:alpha val="43137"/>
+                    </a:srgbClr>
+                  </a:outerShdw>
+                </a:effectLst>
               </a:rPr>
               <a:t>Abhängigkeit von Technologie</a:t>
             </a:r>
@@ -5867,6 +6124,13 @@
                 <a:solidFill>
                   <a:schemeClr val="bg1"/>
                 </a:solidFill>
+                <a:effectLst>
+                  <a:outerShdw blurRad="38100" dist="38100" dir="2700000" algn="tl">
+                    <a:srgbClr val="000000">
+                      <a:alpha val="43137"/>
+                    </a:srgbClr>
+                  </a:outerShdw>
+                </a:effectLst>
               </a:rPr>
               <a:t>: Ein verstärkter Einsatz von Militärrobotern könnte zu einer übermäßigen Abhängigkeit von Technologie führen, was die Verwundbarkeit gegenüber Cyberangriffen erhöht.</a:t>
             </a:r>
@@ -5881,6 +6145,13 @@
                 <a:solidFill>
                   <a:schemeClr val="bg1"/>
                 </a:solidFill>
+                <a:effectLst>
+                  <a:outerShdw blurRad="38100" dist="38100" dir="2700000" algn="tl">
+                    <a:srgbClr val="000000">
+                      <a:alpha val="43137"/>
+                    </a:srgbClr>
+                  </a:outerShdw>
+                </a:effectLst>
               </a:rPr>
               <a:t>Verlust menschlicher Arbeitsplätze</a:t>
             </a:r>
@@ -5889,6 +6160,13 @@
                 <a:solidFill>
                   <a:schemeClr val="bg1"/>
                 </a:solidFill>
+                <a:effectLst>
+                  <a:outerShdw blurRad="38100" dist="38100" dir="2700000" algn="tl">
+                    <a:srgbClr val="000000">
+                      <a:alpha val="43137"/>
+                    </a:srgbClr>
+                  </a:outerShdw>
+                </a:effectLst>
               </a:rPr>
               <a:t>: Die Automatisierung von militärischen Aufgaben könnte zu einem Verlust von Arbeitsplätzen für Soldaten führen.</a:t>
             </a:r>
@@ -6332,7 +6610,13 @@
                 <a:solidFill>
                   <a:srgbClr val="FFFFFF"/>
                 </a:solidFill>
-                <a:effectLst/>
+                <a:effectLst>
+                  <a:outerShdw blurRad="38100" dist="38100" dir="2700000" algn="tl">
+                    <a:srgbClr val="000000">
+                      <a:alpha val="43137"/>
+                    </a:srgbClr>
+                  </a:outerShdw>
+                </a:effectLst>
               </a:rPr>
               <a:t>Auswirkungen</a:t>
             </a:r>
@@ -6341,7 +6625,13 @@
                 <a:solidFill>
                   <a:srgbClr val="FFFFFF"/>
                 </a:solidFill>
-                <a:effectLst/>
+                <a:effectLst>
+                  <a:outerShdw blurRad="38100" dist="38100" dir="2700000" algn="tl">
+                    <a:srgbClr val="000000">
+                      <a:alpha val="43137"/>
+                    </a:srgbClr>
+                  </a:outerShdw>
+                </a:effectLst>
               </a:rPr>
               <a:t>:</a:t>
             </a:r>
@@ -6349,7 +6639,13 @@
               <a:solidFill>
                 <a:srgbClr val="FFFFFF"/>
               </a:solidFill>
-              <a:effectLst/>
+              <a:effectLst>
+                <a:outerShdw blurRad="38100" dist="38100" dir="2700000" algn="tl">
+                  <a:srgbClr val="000000">
+                    <a:alpha val="43137"/>
+                  </a:srgbClr>
+                </a:outerShdw>
+              </a:effectLst>
             </a:endParaRPr>
           </a:p>
           <a:p>
@@ -6369,7 +6665,13 @@
                 <a:solidFill>
                   <a:srgbClr val="FFFFFF"/>
                 </a:solidFill>
-                <a:effectLst/>
+                <a:effectLst>
+                  <a:outerShdw blurRad="38100" dist="38100" dir="2700000" algn="tl">
+                    <a:srgbClr val="000000">
+                      <a:alpha val="43137"/>
+                    </a:srgbClr>
+                  </a:outerShdw>
+                </a:effectLst>
               </a:rPr>
               <a:t>Arbeitsplatzverluste</a:t>
             </a:r>
@@ -6378,7 +6680,13 @@
                 <a:solidFill>
                   <a:srgbClr val="FFFFFF"/>
                 </a:solidFill>
-                <a:effectLst/>
+                <a:effectLst>
+                  <a:outerShdw blurRad="38100" dist="38100" dir="2700000" algn="tl">
+                    <a:srgbClr val="000000">
+                      <a:alpha val="43137"/>
+                    </a:srgbClr>
+                  </a:outerShdw>
+                </a:effectLst>
               </a:rPr>
               <a:t> und </a:t>
             </a:r>
@@ -6387,7 +6695,13 @@
                 <a:solidFill>
                   <a:srgbClr val="FFFFFF"/>
                 </a:solidFill>
-                <a:effectLst/>
+                <a:effectLst>
+                  <a:outerShdw blurRad="38100" dist="38100" dir="2700000" algn="tl">
+                    <a:srgbClr val="000000">
+                      <a:alpha val="43137"/>
+                    </a:srgbClr>
+                  </a:outerShdw>
+                </a:effectLst>
               </a:rPr>
               <a:t>Strukturwandel</a:t>
             </a:r>
@@ -6396,7 +6710,13 @@
                 <a:solidFill>
                   <a:srgbClr val="FFFFFF"/>
                 </a:solidFill>
-                <a:effectLst/>
+                <a:effectLst>
+                  <a:outerShdw blurRad="38100" dist="38100" dir="2700000" algn="tl">
+                    <a:srgbClr val="000000">
+                      <a:alpha val="43137"/>
+                    </a:srgbClr>
+                  </a:outerShdw>
+                </a:effectLst>
               </a:rPr>
               <a:t>: </a:t>
             </a:r>
@@ -6405,7 +6725,13 @@
                 <a:solidFill>
                   <a:srgbClr val="FFFFFF"/>
                 </a:solidFill>
-                <a:effectLst/>
+                <a:effectLst>
+                  <a:outerShdw blurRad="38100" dist="38100" dir="2700000" algn="tl">
+                    <a:srgbClr val="000000">
+                      <a:alpha val="43137"/>
+                    </a:srgbClr>
+                  </a:outerShdw>
+                </a:effectLst>
               </a:rPr>
               <a:t>Automatisierung</a:t>
             </a:r>
@@ -6414,7 +6740,13 @@
                 <a:solidFill>
                   <a:srgbClr val="FFFFFF"/>
                 </a:solidFill>
-                <a:effectLst/>
+                <a:effectLst>
+                  <a:outerShdw blurRad="38100" dist="38100" dir="2700000" algn="tl">
+                    <a:srgbClr val="000000">
+                      <a:alpha val="43137"/>
+                    </a:srgbClr>
+                  </a:outerShdw>
+                </a:effectLst>
               </a:rPr>
               <a:t> </a:t>
             </a:r>
@@ -6423,7 +6755,13 @@
                 <a:solidFill>
                   <a:srgbClr val="FFFFFF"/>
                 </a:solidFill>
-                <a:effectLst/>
+                <a:effectLst>
+                  <a:outerShdw blurRad="38100" dist="38100" dir="2700000" algn="tl">
+                    <a:srgbClr val="000000">
+                      <a:alpha val="43137"/>
+                    </a:srgbClr>
+                  </a:outerShdw>
+                </a:effectLst>
               </a:rPr>
               <a:t>könnte</a:t>
             </a:r>
@@ -6432,7 +6770,13 @@
                 <a:solidFill>
                   <a:srgbClr val="FFFFFF"/>
                 </a:solidFill>
-                <a:effectLst/>
+                <a:effectLst>
+                  <a:outerShdw blurRad="38100" dist="38100" dir="2700000" algn="tl">
+                    <a:srgbClr val="000000">
+                      <a:alpha val="43137"/>
+                    </a:srgbClr>
+                  </a:outerShdw>
+                </a:effectLst>
               </a:rPr>
               <a:t> </a:t>
             </a:r>
@@ -6441,7 +6785,13 @@
                 <a:solidFill>
                   <a:srgbClr val="FFFFFF"/>
                 </a:solidFill>
-                <a:effectLst/>
+                <a:effectLst>
+                  <a:outerShdw blurRad="38100" dist="38100" dir="2700000" algn="tl">
+                    <a:srgbClr val="000000">
+                      <a:alpha val="43137"/>
+                    </a:srgbClr>
+                  </a:outerShdw>
+                </a:effectLst>
               </a:rPr>
               <a:t>zu</a:t>
             </a:r>
@@ -6450,7 +6800,13 @@
                 <a:solidFill>
                   <a:srgbClr val="FFFFFF"/>
                 </a:solidFill>
-                <a:effectLst/>
+                <a:effectLst>
+                  <a:outerShdw blurRad="38100" dist="38100" dir="2700000" algn="tl">
+                    <a:srgbClr val="000000">
+                      <a:alpha val="43137"/>
+                    </a:srgbClr>
+                  </a:outerShdw>
+                </a:effectLst>
               </a:rPr>
               <a:t> </a:t>
             </a:r>
@@ -6459,7 +6815,13 @@
                 <a:solidFill>
                   <a:srgbClr val="FFFFFF"/>
                 </a:solidFill>
-                <a:effectLst/>
+                <a:effectLst>
+                  <a:outerShdw blurRad="38100" dist="38100" dir="2700000" algn="tl">
+                    <a:srgbClr val="000000">
+                      <a:alpha val="43137"/>
+                    </a:srgbClr>
+                  </a:outerShdw>
+                </a:effectLst>
               </a:rPr>
               <a:t>einem</a:t>
             </a:r>
@@ -6468,7 +6830,13 @@
                 <a:solidFill>
                   <a:srgbClr val="FFFFFF"/>
                 </a:solidFill>
-                <a:effectLst/>
+                <a:effectLst>
+                  <a:outerShdw blurRad="38100" dist="38100" dir="2700000" algn="tl">
+                    <a:srgbClr val="000000">
+                      <a:alpha val="43137"/>
+                    </a:srgbClr>
+                  </a:outerShdw>
+                </a:effectLst>
               </a:rPr>
               <a:t> </a:t>
             </a:r>
@@ -6477,7 +6845,13 @@
                 <a:solidFill>
                   <a:srgbClr val="FFFFFF"/>
                 </a:solidFill>
-                <a:effectLst/>
+                <a:effectLst>
+                  <a:outerShdw blurRad="38100" dist="38100" dir="2700000" algn="tl">
+                    <a:srgbClr val="000000">
+                      <a:alpha val="43137"/>
+                    </a:srgbClr>
+                  </a:outerShdw>
+                </a:effectLst>
               </a:rPr>
               <a:t>Wandel</a:t>
             </a:r>
@@ -6486,7 +6860,13 @@
                 <a:solidFill>
                   <a:srgbClr val="FFFFFF"/>
                 </a:solidFill>
-                <a:effectLst/>
+                <a:effectLst>
+                  <a:outerShdw blurRad="38100" dist="38100" dir="2700000" algn="tl">
+                    <a:srgbClr val="000000">
+                      <a:alpha val="43137"/>
+                    </a:srgbClr>
+                  </a:outerShdw>
+                </a:effectLst>
               </a:rPr>
               <a:t> in </a:t>
             </a:r>
@@ -6495,7 +6875,13 @@
                 <a:solidFill>
                   <a:srgbClr val="FFFFFF"/>
                 </a:solidFill>
-                <a:effectLst/>
+                <a:effectLst>
+                  <a:outerShdw blurRad="38100" dist="38100" dir="2700000" algn="tl">
+                    <a:srgbClr val="000000">
+                      <a:alpha val="43137"/>
+                    </a:srgbClr>
+                  </a:outerShdw>
+                </a:effectLst>
               </a:rPr>
               <a:t>militärischen</a:t>
             </a:r>
@@ -6504,7 +6890,13 @@
                 <a:solidFill>
                   <a:srgbClr val="FFFFFF"/>
                 </a:solidFill>
-                <a:effectLst/>
+                <a:effectLst>
+                  <a:outerShdw blurRad="38100" dist="38100" dir="2700000" algn="tl">
+                    <a:srgbClr val="000000">
+                      <a:alpha val="43137"/>
+                    </a:srgbClr>
+                  </a:outerShdw>
+                </a:effectLst>
               </a:rPr>
               <a:t> </a:t>
             </a:r>
@@ -6513,7 +6905,13 @@
                 <a:solidFill>
                   <a:srgbClr val="FFFFFF"/>
                 </a:solidFill>
-                <a:effectLst/>
+                <a:effectLst>
+                  <a:outerShdw blurRad="38100" dist="38100" dir="2700000" algn="tl">
+                    <a:srgbClr val="000000">
+                      <a:alpha val="43137"/>
+                    </a:srgbClr>
+                  </a:outerShdw>
+                </a:effectLst>
               </a:rPr>
               <a:t>Berufen</a:t>
             </a:r>
@@ -6522,7 +6920,13 @@
                 <a:solidFill>
                   <a:srgbClr val="FFFFFF"/>
                 </a:solidFill>
-                <a:effectLst/>
+                <a:effectLst>
+                  <a:outerShdw blurRad="38100" dist="38100" dir="2700000" algn="tl">
+                    <a:srgbClr val="000000">
+                      <a:alpha val="43137"/>
+                    </a:srgbClr>
+                  </a:outerShdw>
+                </a:effectLst>
               </a:rPr>
               <a:t> </a:t>
             </a:r>
@@ -6531,7 +6935,13 @@
                 <a:solidFill>
                   <a:srgbClr val="FFFFFF"/>
                 </a:solidFill>
-                <a:effectLst/>
+                <a:effectLst>
+                  <a:outerShdw blurRad="38100" dist="38100" dir="2700000" algn="tl">
+                    <a:srgbClr val="000000">
+                      <a:alpha val="43137"/>
+                    </a:srgbClr>
+                  </a:outerShdw>
+                </a:effectLst>
               </a:rPr>
               <a:t>führen</a:t>
             </a:r>
@@ -6540,7 +6950,13 @@
                 <a:solidFill>
                   <a:srgbClr val="FFFFFF"/>
                 </a:solidFill>
-                <a:effectLst/>
+                <a:effectLst>
+                  <a:outerShdw blurRad="38100" dist="38100" dir="2700000" algn="tl">
+                    <a:srgbClr val="000000">
+                      <a:alpha val="43137"/>
+                    </a:srgbClr>
+                  </a:outerShdw>
+                </a:effectLst>
               </a:rPr>
               <a:t> und </a:t>
             </a:r>
@@ -6549,7 +6965,13 @@
                 <a:solidFill>
                   <a:srgbClr val="FFFFFF"/>
                 </a:solidFill>
-                <a:effectLst/>
+                <a:effectLst>
+                  <a:outerShdw blurRad="38100" dist="38100" dir="2700000" algn="tl">
+                    <a:srgbClr val="000000">
+                      <a:alpha val="43137"/>
+                    </a:srgbClr>
+                  </a:outerShdw>
+                </a:effectLst>
               </a:rPr>
               <a:t>Arbeitsplätze</a:t>
             </a:r>
@@ -6558,7 +6980,13 @@
                 <a:solidFill>
                   <a:srgbClr val="FFFFFF"/>
                 </a:solidFill>
-                <a:effectLst/>
+                <a:effectLst>
+                  <a:outerShdw blurRad="38100" dist="38100" dir="2700000" algn="tl">
+                    <a:srgbClr val="000000">
+                      <a:alpha val="43137"/>
+                    </a:srgbClr>
+                  </a:outerShdw>
+                </a:effectLst>
               </a:rPr>
               <a:t> </a:t>
             </a:r>
@@ -6567,7 +6995,13 @@
                 <a:solidFill>
                   <a:srgbClr val="FFFFFF"/>
                 </a:solidFill>
-                <a:effectLst/>
+                <a:effectLst>
+                  <a:outerShdw blurRad="38100" dist="38100" dir="2700000" algn="tl">
+                    <a:srgbClr val="000000">
+                      <a:alpha val="43137"/>
+                    </a:srgbClr>
+                  </a:outerShdw>
+                </a:effectLst>
               </a:rPr>
               <a:t>gefährden</a:t>
             </a:r>
@@ -6576,7 +7010,13 @@
                 <a:solidFill>
                   <a:srgbClr val="FFFFFF"/>
                 </a:solidFill>
-                <a:effectLst/>
+                <a:effectLst>
+                  <a:outerShdw blurRad="38100" dist="38100" dir="2700000" algn="tl">
+                    <a:srgbClr val="000000">
+                      <a:alpha val="43137"/>
+                    </a:srgbClr>
+                  </a:outerShdw>
+                </a:effectLst>
               </a:rPr>
               <a:t>.</a:t>
             </a:r>
@@ -6598,7 +7038,13 @@
                 <a:solidFill>
                   <a:srgbClr val="FFFFFF"/>
                 </a:solidFill>
-                <a:effectLst/>
+                <a:effectLst>
+                  <a:outerShdw blurRad="38100" dist="38100" dir="2700000" algn="tl">
+                    <a:srgbClr val="000000">
+                      <a:alpha val="43137"/>
+                    </a:srgbClr>
+                  </a:outerShdw>
+                </a:effectLst>
               </a:rPr>
               <a:t>Ethik</a:t>
             </a:r>
@@ -6607,7 +7053,13 @@
                 <a:solidFill>
                   <a:srgbClr val="FFFFFF"/>
                 </a:solidFill>
-                <a:effectLst/>
+                <a:effectLst>
+                  <a:outerShdw blurRad="38100" dist="38100" dir="2700000" algn="tl">
+                    <a:srgbClr val="000000">
+                      <a:alpha val="43137"/>
+                    </a:srgbClr>
+                  </a:outerShdw>
+                </a:effectLst>
               </a:rPr>
               <a:t>- und </a:t>
             </a:r>
@@ -6616,7 +7068,13 @@
                 <a:solidFill>
                   <a:srgbClr val="FFFFFF"/>
                 </a:solidFill>
-                <a:effectLst/>
+                <a:effectLst>
+                  <a:outerShdw blurRad="38100" dist="38100" dir="2700000" algn="tl">
+                    <a:srgbClr val="000000">
+                      <a:alpha val="43137"/>
+                    </a:srgbClr>
+                  </a:outerShdw>
+                </a:effectLst>
               </a:rPr>
               <a:t>Sicherheitsbedenken</a:t>
             </a:r>
@@ -6625,7 +7083,13 @@
                 <a:solidFill>
                   <a:srgbClr val="FFFFFF"/>
                 </a:solidFill>
-                <a:effectLst/>
+                <a:effectLst>
+                  <a:outerShdw blurRad="38100" dist="38100" dir="2700000" algn="tl">
+                    <a:srgbClr val="000000">
+                      <a:alpha val="43137"/>
+                    </a:srgbClr>
+                  </a:outerShdw>
+                </a:effectLst>
               </a:rPr>
               <a:t>: Die </a:t>
             </a:r>
@@ -6634,7 +7098,13 @@
                 <a:solidFill>
                   <a:srgbClr val="FFFFFF"/>
                 </a:solidFill>
-                <a:effectLst/>
+                <a:effectLst>
+                  <a:outerShdw blurRad="38100" dist="38100" dir="2700000" algn="tl">
+                    <a:srgbClr val="000000">
+                      <a:alpha val="43137"/>
+                    </a:srgbClr>
+                  </a:outerShdw>
+                </a:effectLst>
               </a:rPr>
               <a:t>Verwendung</a:t>
             </a:r>
@@ -6643,7 +7113,13 @@
                 <a:solidFill>
                   <a:srgbClr val="FFFFFF"/>
                 </a:solidFill>
-                <a:effectLst/>
+                <a:effectLst>
+                  <a:outerShdw blurRad="38100" dist="38100" dir="2700000" algn="tl">
+                    <a:srgbClr val="000000">
+                      <a:alpha val="43137"/>
+                    </a:srgbClr>
+                  </a:outerShdw>
+                </a:effectLst>
               </a:rPr>
               <a:t> </a:t>
             </a:r>
@@ -6652,7 +7128,13 @@
                 <a:solidFill>
                   <a:srgbClr val="FFFFFF"/>
                 </a:solidFill>
-                <a:effectLst/>
+                <a:effectLst>
+                  <a:outerShdw blurRad="38100" dist="38100" dir="2700000" algn="tl">
+                    <a:srgbClr val="000000">
+                      <a:alpha val="43137"/>
+                    </a:srgbClr>
+                  </a:outerShdw>
+                </a:effectLst>
               </a:rPr>
               <a:t>autonomer</a:t>
             </a:r>
@@ -6661,7 +7143,13 @@
                 <a:solidFill>
                   <a:srgbClr val="FFFFFF"/>
                 </a:solidFill>
-                <a:effectLst/>
+                <a:effectLst>
+                  <a:outerShdw blurRad="38100" dist="38100" dir="2700000" algn="tl">
+                    <a:srgbClr val="000000">
+                      <a:alpha val="43137"/>
+                    </a:srgbClr>
+                  </a:outerShdw>
+                </a:effectLst>
               </a:rPr>
               <a:t> </a:t>
             </a:r>
@@ -6670,7 +7158,13 @@
                 <a:solidFill>
                   <a:srgbClr val="FFFFFF"/>
                 </a:solidFill>
-                <a:effectLst/>
+                <a:effectLst>
+                  <a:outerShdw blurRad="38100" dist="38100" dir="2700000" algn="tl">
+                    <a:srgbClr val="000000">
+                      <a:alpha val="43137"/>
+                    </a:srgbClr>
+                  </a:outerShdw>
+                </a:effectLst>
               </a:rPr>
               <a:t>Waffensysteme</a:t>
             </a:r>
@@ -6679,7 +7173,13 @@
                 <a:solidFill>
                   <a:srgbClr val="FFFFFF"/>
                 </a:solidFill>
-                <a:effectLst/>
+                <a:effectLst>
+                  <a:outerShdw blurRad="38100" dist="38100" dir="2700000" algn="tl">
+                    <a:srgbClr val="000000">
+                      <a:alpha val="43137"/>
+                    </a:srgbClr>
+                  </a:outerShdw>
+                </a:effectLst>
               </a:rPr>
               <a:t> </a:t>
             </a:r>
@@ -6688,7 +7188,13 @@
                 <a:solidFill>
                   <a:srgbClr val="FFFFFF"/>
                 </a:solidFill>
-                <a:effectLst/>
+                <a:effectLst>
+                  <a:outerShdw blurRad="38100" dist="38100" dir="2700000" algn="tl">
+                    <a:srgbClr val="000000">
+                      <a:alpha val="43137"/>
+                    </a:srgbClr>
+                  </a:outerShdw>
+                </a:effectLst>
               </a:rPr>
               <a:t>wirft</a:t>
             </a:r>
@@ -6697,7 +7203,13 @@
                 <a:solidFill>
                   <a:srgbClr val="FFFFFF"/>
                 </a:solidFill>
-                <a:effectLst/>
+                <a:effectLst>
+                  <a:outerShdw blurRad="38100" dist="38100" dir="2700000" algn="tl">
+                    <a:srgbClr val="000000">
+                      <a:alpha val="43137"/>
+                    </a:srgbClr>
+                  </a:outerShdw>
+                </a:effectLst>
               </a:rPr>
               <a:t> </a:t>
             </a:r>
@@ -6706,7 +7218,13 @@
                 <a:solidFill>
                   <a:srgbClr val="FFFFFF"/>
                 </a:solidFill>
-                <a:effectLst/>
+                <a:effectLst>
+                  <a:outerShdw blurRad="38100" dist="38100" dir="2700000" algn="tl">
+                    <a:srgbClr val="000000">
+                      <a:alpha val="43137"/>
+                    </a:srgbClr>
+                  </a:outerShdw>
+                </a:effectLst>
               </a:rPr>
               <a:t>Fragen</a:t>
             </a:r>
@@ -6715,7 +7233,13 @@
                 <a:solidFill>
                   <a:srgbClr val="FFFFFF"/>
                 </a:solidFill>
-                <a:effectLst/>
+                <a:effectLst>
+                  <a:outerShdw blurRad="38100" dist="38100" dir="2700000" algn="tl">
+                    <a:srgbClr val="000000">
+                      <a:alpha val="43137"/>
+                    </a:srgbClr>
+                  </a:outerShdw>
+                </a:effectLst>
               </a:rPr>
               <a:t> </a:t>
             </a:r>
@@ -6724,7 +7248,13 @@
                 <a:solidFill>
                   <a:srgbClr val="FFFFFF"/>
                 </a:solidFill>
-                <a:effectLst/>
+                <a:effectLst>
+                  <a:outerShdw blurRad="38100" dist="38100" dir="2700000" algn="tl">
+                    <a:srgbClr val="000000">
+                      <a:alpha val="43137"/>
+                    </a:srgbClr>
+                  </a:outerShdw>
+                </a:effectLst>
               </a:rPr>
               <a:t>nach</a:t>
             </a:r>
@@ -6733,7 +7263,13 @@
                 <a:solidFill>
                   <a:srgbClr val="FFFFFF"/>
                 </a:solidFill>
-                <a:effectLst/>
+                <a:effectLst>
+                  <a:outerShdw blurRad="38100" dist="38100" dir="2700000" algn="tl">
+                    <a:srgbClr val="000000">
+                      <a:alpha val="43137"/>
+                    </a:srgbClr>
+                  </a:outerShdw>
+                </a:effectLst>
               </a:rPr>
               <a:t> Moral und </a:t>
             </a:r>
@@ -6742,7 +7278,13 @@
                 <a:solidFill>
                   <a:srgbClr val="FFFFFF"/>
                 </a:solidFill>
-                <a:effectLst/>
+                <a:effectLst>
+                  <a:outerShdw blurRad="38100" dist="38100" dir="2700000" algn="tl">
+                    <a:srgbClr val="000000">
+                      <a:alpha val="43137"/>
+                    </a:srgbClr>
+                  </a:outerShdw>
+                </a:effectLst>
               </a:rPr>
               <a:t>Sicherheit</a:t>
             </a:r>
@@ -6751,7 +7293,13 @@
                 <a:solidFill>
                   <a:srgbClr val="FFFFFF"/>
                 </a:solidFill>
-                <a:effectLst/>
+                <a:effectLst>
+                  <a:outerShdw blurRad="38100" dist="38100" dir="2700000" algn="tl">
+                    <a:srgbClr val="000000">
+                      <a:alpha val="43137"/>
+                    </a:srgbClr>
+                  </a:outerShdw>
+                </a:effectLst>
               </a:rPr>
               <a:t> auf.</a:t>
             </a:r>
@@ -6773,7 +7321,13 @@
                 <a:solidFill>
                   <a:srgbClr val="FFFFFF"/>
                 </a:solidFill>
-                <a:effectLst/>
+                <a:effectLst>
+                  <a:outerShdw blurRad="38100" dist="38100" dir="2700000" algn="tl">
+                    <a:srgbClr val="000000">
+                      <a:alpha val="43137"/>
+                    </a:srgbClr>
+                  </a:outerShdw>
+                </a:effectLst>
               </a:rPr>
               <a:t>Technologischer</a:t>
             </a:r>
@@ -6782,7 +7336,13 @@
                 <a:solidFill>
                   <a:srgbClr val="FFFFFF"/>
                 </a:solidFill>
-                <a:effectLst/>
+                <a:effectLst>
+                  <a:outerShdw blurRad="38100" dist="38100" dir="2700000" algn="tl">
+                    <a:srgbClr val="000000">
+                      <a:alpha val="43137"/>
+                    </a:srgbClr>
+                  </a:outerShdw>
+                </a:effectLst>
               </a:rPr>
               <a:t> </a:t>
             </a:r>
@@ -6791,7 +7351,13 @@
                 <a:solidFill>
                   <a:srgbClr val="FFFFFF"/>
                 </a:solidFill>
-                <a:effectLst/>
+                <a:effectLst>
+                  <a:outerShdw blurRad="38100" dist="38100" dir="2700000" algn="tl">
+                    <a:srgbClr val="000000">
+                      <a:alpha val="43137"/>
+                    </a:srgbClr>
+                  </a:outerShdw>
+                </a:effectLst>
               </a:rPr>
               <a:t>Fortschritt</a:t>
             </a:r>
@@ -6800,7 +7366,13 @@
                 <a:solidFill>
                   <a:srgbClr val="FFFFFF"/>
                 </a:solidFill>
-                <a:effectLst/>
+                <a:effectLst>
+                  <a:outerShdw blurRad="38100" dist="38100" dir="2700000" algn="tl">
+                    <a:srgbClr val="000000">
+                      <a:alpha val="43137"/>
+                    </a:srgbClr>
+                  </a:outerShdw>
+                </a:effectLst>
               </a:rPr>
               <a:t> und Innovation</a:t>
             </a:r>
@@ -6809,7 +7381,13 @@
                 <a:solidFill>
                   <a:srgbClr val="FFFFFF"/>
                 </a:solidFill>
-                <a:effectLst/>
+                <a:effectLst>
+                  <a:outerShdw blurRad="38100" dist="38100" dir="2700000" algn="tl">
+                    <a:srgbClr val="000000">
+                      <a:alpha val="43137"/>
+                    </a:srgbClr>
+                  </a:outerShdw>
+                </a:effectLst>
               </a:rPr>
               <a:t>: Der </a:t>
             </a:r>
@@ -6818,7 +7396,13 @@
                 <a:solidFill>
                   <a:srgbClr val="FFFFFF"/>
                 </a:solidFill>
-                <a:effectLst/>
+                <a:effectLst>
+                  <a:outerShdw blurRad="38100" dist="38100" dir="2700000" algn="tl">
+                    <a:srgbClr val="000000">
+                      <a:alpha val="43137"/>
+                    </a:srgbClr>
+                  </a:outerShdw>
+                </a:effectLst>
               </a:rPr>
               <a:t>Einsatz</a:t>
             </a:r>
@@ -6827,7 +7411,13 @@
                 <a:solidFill>
                   <a:srgbClr val="FFFFFF"/>
                 </a:solidFill>
-                <a:effectLst/>
+                <a:effectLst>
+                  <a:outerShdw blurRad="38100" dist="38100" dir="2700000" algn="tl">
+                    <a:srgbClr val="000000">
+                      <a:alpha val="43137"/>
+                    </a:srgbClr>
+                  </a:outerShdw>
+                </a:effectLst>
               </a:rPr>
               <a:t> von </a:t>
             </a:r>
@@ -6836,7 +7426,13 @@
                 <a:solidFill>
                   <a:srgbClr val="FFFFFF"/>
                 </a:solidFill>
-                <a:effectLst/>
+                <a:effectLst>
+                  <a:outerShdw blurRad="38100" dist="38100" dir="2700000" algn="tl">
+                    <a:srgbClr val="000000">
+                      <a:alpha val="43137"/>
+                    </a:srgbClr>
+                  </a:outerShdw>
+                </a:effectLst>
               </a:rPr>
               <a:t>Militärrobotern</a:t>
             </a:r>
@@ -6845,7 +7441,13 @@
                 <a:solidFill>
                   <a:srgbClr val="FFFFFF"/>
                 </a:solidFill>
-                <a:effectLst/>
+                <a:effectLst>
+                  <a:outerShdw blurRad="38100" dist="38100" dir="2700000" algn="tl">
+                    <a:srgbClr val="000000">
+                      <a:alpha val="43137"/>
+                    </a:srgbClr>
+                  </a:outerShdw>
+                </a:effectLst>
               </a:rPr>
               <a:t> </a:t>
             </a:r>
@@ -6854,7 +7456,13 @@
                 <a:solidFill>
                   <a:srgbClr val="FFFFFF"/>
                 </a:solidFill>
-                <a:effectLst/>
+                <a:effectLst>
+                  <a:outerShdw blurRad="38100" dist="38100" dir="2700000" algn="tl">
+                    <a:srgbClr val="000000">
+                      <a:alpha val="43137"/>
+                    </a:srgbClr>
+                  </a:outerShdw>
+                </a:effectLst>
               </a:rPr>
               <a:t>könnte</a:t>
             </a:r>
@@ -6863,7 +7471,13 @@
                 <a:solidFill>
                   <a:srgbClr val="FFFFFF"/>
                 </a:solidFill>
-                <a:effectLst/>
+                <a:effectLst>
+                  <a:outerShdw blurRad="38100" dist="38100" dir="2700000" algn="tl">
+                    <a:srgbClr val="000000">
+                      <a:alpha val="43137"/>
+                    </a:srgbClr>
+                  </a:outerShdw>
+                </a:effectLst>
               </a:rPr>
               <a:t> </a:t>
             </a:r>
@@ -6872,7 +7486,13 @@
                 <a:solidFill>
                   <a:srgbClr val="FFFFFF"/>
                 </a:solidFill>
-                <a:effectLst/>
+                <a:effectLst>
+                  <a:outerShdw blurRad="38100" dist="38100" dir="2700000" algn="tl">
+                    <a:srgbClr val="000000">
+                      <a:alpha val="43137"/>
+                    </a:srgbClr>
+                  </a:outerShdw>
+                </a:effectLst>
               </a:rPr>
               <a:t>technologischen</a:t>
             </a:r>
@@ -6881,7 +7501,13 @@
                 <a:solidFill>
                   <a:srgbClr val="FFFFFF"/>
                 </a:solidFill>
-                <a:effectLst/>
+                <a:effectLst>
+                  <a:outerShdw blurRad="38100" dist="38100" dir="2700000" algn="tl">
+                    <a:srgbClr val="000000">
+                      <a:alpha val="43137"/>
+                    </a:srgbClr>
+                  </a:outerShdw>
+                </a:effectLst>
               </a:rPr>
               <a:t> </a:t>
             </a:r>
@@ -6890,7 +7516,13 @@
                 <a:solidFill>
                   <a:srgbClr val="FFFFFF"/>
                 </a:solidFill>
-                <a:effectLst/>
+                <a:effectLst>
+                  <a:outerShdw blurRad="38100" dist="38100" dir="2700000" algn="tl">
+                    <a:srgbClr val="000000">
+                      <a:alpha val="43137"/>
+                    </a:srgbClr>
+                  </a:outerShdw>
+                </a:effectLst>
               </a:rPr>
               <a:t>Fortschritt</a:t>
             </a:r>
@@ -6899,7 +7531,13 @@
                 <a:solidFill>
                   <a:srgbClr val="FFFFFF"/>
                 </a:solidFill>
-                <a:effectLst/>
+                <a:effectLst>
+                  <a:outerShdw blurRad="38100" dist="38100" dir="2700000" algn="tl">
+                    <a:srgbClr val="000000">
+                      <a:alpha val="43137"/>
+                    </a:srgbClr>
+                  </a:outerShdw>
+                </a:effectLst>
               </a:rPr>
               <a:t> und </a:t>
             </a:r>
@@ -6908,7 +7546,13 @@
                 <a:solidFill>
                   <a:srgbClr val="FFFFFF"/>
                 </a:solidFill>
-                <a:effectLst/>
+                <a:effectLst>
+                  <a:outerShdw blurRad="38100" dist="38100" dir="2700000" algn="tl">
+                    <a:srgbClr val="000000">
+                      <a:alpha val="43137"/>
+                    </a:srgbClr>
+                  </a:outerShdw>
+                </a:effectLst>
               </a:rPr>
               <a:t>Innovationen</a:t>
             </a:r>
@@ -6917,7 +7561,13 @@
                 <a:solidFill>
                   <a:srgbClr val="FFFFFF"/>
                 </a:solidFill>
-                <a:effectLst/>
+                <a:effectLst>
+                  <a:outerShdw blurRad="38100" dist="38100" dir="2700000" algn="tl">
+                    <a:srgbClr val="000000">
+                      <a:alpha val="43137"/>
+                    </a:srgbClr>
+                  </a:outerShdw>
+                </a:effectLst>
               </a:rPr>
               <a:t> </a:t>
             </a:r>
@@ -6926,7 +7576,13 @@
                 <a:solidFill>
                   <a:srgbClr val="FFFFFF"/>
                 </a:solidFill>
-                <a:effectLst/>
+                <a:effectLst>
+                  <a:outerShdw blurRad="38100" dist="38100" dir="2700000" algn="tl">
+                    <a:srgbClr val="000000">
+                      <a:alpha val="43137"/>
+                    </a:srgbClr>
+                  </a:outerShdw>
+                </a:effectLst>
               </a:rPr>
               <a:t>vorantreiben</a:t>
             </a:r>
@@ -6935,7 +7591,13 @@
                 <a:solidFill>
                   <a:srgbClr val="FFFFFF"/>
                 </a:solidFill>
-                <a:effectLst/>
+                <a:effectLst>
+                  <a:outerShdw blurRad="38100" dist="38100" dir="2700000" algn="tl">
+                    <a:srgbClr val="000000">
+                      <a:alpha val="43137"/>
+                    </a:srgbClr>
+                  </a:outerShdw>
+                </a:effectLst>
               </a:rPr>
               <a:t>.</a:t>
             </a:r>
@@ -6957,7 +7619,13 @@
                 <a:solidFill>
                   <a:srgbClr val="FFFFFF"/>
                 </a:solidFill>
-                <a:effectLst/>
+                <a:effectLst>
+                  <a:outerShdw blurRad="38100" dist="38100" dir="2700000" algn="tl">
+                    <a:srgbClr val="000000">
+                      <a:alpha val="43137"/>
+                    </a:srgbClr>
+                  </a:outerShdw>
+                </a:effectLst>
               </a:rPr>
               <a:t>Internationale</a:t>
             </a:r>
@@ -6966,7 +7634,13 @@
                 <a:solidFill>
                   <a:srgbClr val="FFFFFF"/>
                 </a:solidFill>
-                <a:effectLst/>
+                <a:effectLst>
+                  <a:outerShdw blurRad="38100" dist="38100" dir="2700000" algn="tl">
+                    <a:srgbClr val="000000">
+                      <a:alpha val="43137"/>
+                    </a:srgbClr>
+                  </a:outerShdw>
+                </a:effectLst>
               </a:rPr>
               <a:t> </a:t>
             </a:r>
@@ -6975,7 +7649,13 @@
                 <a:solidFill>
                   <a:srgbClr val="FFFFFF"/>
                 </a:solidFill>
-                <a:effectLst/>
+                <a:effectLst>
+                  <a:outerShdw blurRad="38100" dist="38100" dir="2700000" algn="tl">
+                    <a:srgbClr val="000000">
+                      <a:alpha val="43137"/>
+                    </a:srgbClr>
+                  </a:outerShdw>
+                </a:effectLst>
               </a:rPr>
               <a:t>Beziehungen</a:t>
             </a:r>
@@ -6984,7 +7664,13 @@
                 <a:solidFill>
                   <a:srgbClr val="FFFFFF"/>
                 </a:solidFill>
-                <a:effectLst/>
+                <a:effectLst>
+                  <a:outerShdw blurRad="38100" dist="38100" dir="2700000" algn="tl">
+                    <a:srgbClr val="000000">
+                      <a:alpha val="43137"/>
+                    </a:srgbClr>
+                  </a:outerShdw>
+                </a:effectLst>
               </a:rPr>
               <a:t> und </a:t>
             </a:r>
@@ -6993,7 +7679,13 @@
                 <a:solidFill>
                   <a:srgbClr val="FFFFFF"/>
                 </a:solidFill>
-                <a:effectLst/>
+                <a:effectLst>
+                  <a:outerShdw blurRad="38100" dist="38100" dir="2700000" algn="tl">
+                    <a:srgbClr val="000000">
+                      <a:alpha val="43137"/>
+                    </a:srgbClr>
+                  </a:outerShdw>
+                </a:effectLst>
               </a:rPr>
               <a:t>Konflikte</a:t>
             </a:r>
@@ -7002,7 +7694,13 @@
                 <a:solidFill>
                   <a:srgbClr val="FFFFFF"/>
                 </a:solidFill>
-                <a:effectLst/>
+                <a:effectLst>
+                  <a:outerShdw blurRad="38100" dist="38100" dir="2700000" algn="tl">
+                    <a:srgbClr val="000000">
+                      <a:alpha val="43137"/>
+                    </a:srgbClr>
+                  </a:outerShdw>
+                </a:effectLst>
               </a:rPr>
               <a:t>: Die </a:t>
             </a:r>
@@ -7011,7 +7709,13 @@
                 <a:solidFill>
                   <a:srgbClr val="FFFFFF"/>
                 </a:solidFill>
-                <a:effectLst/>
+                <a:effectLst>
+                  <a:outerShdw blurRad="38100" dist="38100" dir="2700000" algn="tl">
+                    <a:srgbClr val="000000">
+                      <a:alpha val="43137"/>
+                    </a:srgbClr>
+                  </a:outerShdw>
+                </a:effectLst>
               </a:rPr>
               <a:t>Verbreitung</a:t>
             </a:r>
@@ -7020,7 +7724,13 @@
                 <a:solidFill>
                   <a:srgbClr val="FFFFFF"/>
                 </a:solidFill>
-                <a:effectLst/>
+                <a:effectLst>
+                  <a:outerShdw blurRad="38100" dist="38100" dir="2700000" algn="tl">
+                    <a:srgbClr val="000000">
+                      <a:alpha val="43137"/>
+                    </a:srgbClr>
+                  </a:outerShdw>
+                </a:effectLst>
               </a:rPr>
               <a:t> von </a:t>
             </a:r>
@@ -7029,7 +7739,13 @@
                 <a:solidFill>
                   <a:srgbClr val="FFFFFF"/>
                 </a:solidFill>
-                <a:effectLst/>
+                <a:effectLst>
+                  <a:outerShdw blurRad="38100" dist="38100" dir="2700000" algn="tl">
+                    <a:srgbClr val="000000">
+                      <a:alpha val="43137"/>
+                    </a:srgbClr>
+                  </a:outerShdw>
+                </a:effectLst>
               </a:rPr>
               <a:t>Militärrobotern</a:t>
             </a:r>
@@ -7038,7 +7754,13 @@
                 <a:solidFill>
                   <a:srgbClr val="FFFFFF"/>
                 </a:solidFill>
-                <a:effectLst/>
+                <a:effectLst>
+                  <a:outerShdw blurRad="38100" dist="38100" dir="2700000" algn="tl">
+                    <a:srgbClr val="000000">
+                      <a:alpha val="43137"/>
+                    </a:srgbClr>
+                  </a:outerShdw>
+                </a:effectLst>
               </a:rPr>
               <a:t> </a:t>
             </a:r>
@@ -7047,7 +7769,13 @@
                 <a:solidFill>
                   <a:srgbClr val="FFFFFF"/>
                 </a:solidFill>
-                <a:effectLst/>
+                <a:effectLst>
+                  <a:outerShdw blurRad="38100" dist="38100" dir="2700000" algn="tl">
+                    <a:srgbClr val="000000">
+                      <a:alpha val="43137"/>
+                    </a:srgbClr>
+                  </a:outerShdw>
+                </a:effectLst>
               </a:rPr>
               <a:t>könnte</a:t>
             </a:r>
@@ -7056,7 +7784,13 @@
                 <a:solidFill>
                   <a:srgbClr val="FFFFFF"/>
                 </a:solidFill>
-                <a:effectLst/>
+                <a:effectLst>
+                  <a:outerShdw blurRad="38100" dist="38100" dir="2700000" algn="tl">
+                    <a:srgbClr val="000000">
+                      <a:alpha val="43137"/>
+                    </a:srgbClr>
+                  </a:outerShdw>
+                </a:effectLst>
               </a:rPr>
               <a:t> </a:t>
             </a:r>
@@ -7065,7 +7799,13 @@
                 <a:solidFill>
                   <a:srgbClr val="FFFFFF"/>
                 </a:solidFill>
-                <a:effectLst/>
+                <a:effectLst>
+                  <a:outerShdw blurRad="38100" dist="38100" dir="2700000" algn="tl">
+                    <a:srgbClr val="000000">
+                      <a:alpha val="43137"/>
+                    </a:srgbClr>
+                  </a:outerShdw>
+                </a:effectLst>
               </a:rPr>
               <a:t>zu</a:t>
             </a:r>
@@ -7074,7 +7814,13 @@
                 <a:solidFill>
                   <a:srgbClr val="FFFFFF"/>
                 </a:solidFill>
-                <a:effectLst/>
+                <a:effectLst>
+                  <a:outerShdw blurRad="38100" dist="38100" dir="2700000" algn="tl">
+                    <a:srgbClr val="000000">
+                      <a:alpha val="43137"/>
+                    </a:srgbClr>
+                  </a:outerShdw>
+                </a:effectLst>
               </a:rPr>
               <a:t> </a:t>
             </a:r>
@@ -7083,7 +7829,13 @@
                 <a:solidFill>
                   <a:srgbClr val="FFFFFF"/>
                 </a:solidFill>
-                <a:effectLst/>
+                <a:effectLst>
+                  <a:outerShdw blurRad="38100" dist="38100" dir="2700000" algn="tl">
+                    <a:srgbClr val="000000">
+                      <a:alpha val="43137"/>
+                    </a:srgbClr>
+                  </a:outerShdw>
+                </a:effectLst>
               </a:rPr>
               <a:t>Spannungen</a:t>
             </a:r>
@@ -7092,7 +7844,13 @@
                 <a:solidFill>
                   <a:srgbClr val="FFFFFF"/>
                 </a:solidFill>
-                <a:effectLst/>
+                <a:effectLst>
+                  <a:outerShdw blurRad="38100" dist="38100" dir="2700000" algn="tl">
+                    <a:srgbClr val="000000">
+                      <a:alpha val="43137"/>
+                    </a:srgbClr>
+                  </a:outerShdw>
+                </a:effectLst>
               </a:rPr>
               <a:t> </a:t>
             </a:r>
@@ -7101,7 +7859,13 @@
                 <a:solidFill>
                   <a:srgbClr val="FFFFFF"/>
                 </a:solidFill>
-                <a:effectLst/>
+                <a:effectLst>
+                  <a:outerShdw blurRad="38100" dist="38100" dir="2700000" algn="tl">
+                    <a:srgbClr val="000000">
+                      <a:alpha val="43137"/>
+                    </a:srgbClr>
+                  </a:outerShdw>
+                </a:effectLst>
               </a:rPr>
               <a:t>zwischen</a:t>
             </a:r>
@@ -7110,7 +7874,13 @@
                 <a:solidFill>
                   <a:srgbClr val="FFFFFF"/>
                 </a:solidFill>
-                <a:effectLst/>
+                <a:effectLst>
+                  <a:outerShdw blurRad="38100" dist="38100" dir="2700000" algn="tl">
+                    <a:srgbClr val="000000">
+                      <a:alpha val="43137"/>
+                    </a:srgbClr>
+                  </a:outerShdw>
+                </a:effectLst>
               </a:rPr>
               <a:t> </a:t>
             </a:r>
@@ -7119,7 +7889,13 @@
                 <a:solidFill>
                   <a:srgbClr val="FFFFFF"/>
                 </a:solidFill>
-                <a:effectLst/>
+                <a:effectLst>
+                  <a:outerShdw blurRad="38100" dist="38100" dir="2700000" algn="tl">
+                    <a:srgbClr val="000000">
+                      <a:alpha val="43137"/>
+                    </a:srgbClr>
+                  </a:outerShdw>
+                </a:effectLst>
               </a:rPr>
               <a:t>Ländern</a:t>
             </a:r>
@@ -7128,7 +7904,13 @@
                 <a:solidFill>
                   <a:srgbClr val="FFFFFF"/>
                 </a:solidFill>
-                <a:effectLst/>
+                <a:effectLst>
+                  <a:outerShdw blurRad="38100" dist="38100" dir="2700000" algn="tl">
+                    <a:srgbClr val="000000">
+                      <a:alpha val="43137"/>
+                    </a:srgbClr>
+                  </a:outerShdw>
+                </a:effectLst>
               </a:rPr>
               <a:t> </a:t>
             </a:r>
@@ -7137,7 +7919,13 @@
                 <a:solidFill>
                   <a:srgbClr val="FFFFFF"/>
                 </a:solidFill>
-                <a:effectLst/>
+                <a:effectLst>
+                  <a:outerShdw blurRad="38100" dist="38100" dir="2700000" algn="tl">
+                    <a:srgbClr val="000000">
+                      <a:alpha val="43137"/>
+                    </a:srgbClr>
+                  </a:outerShdw>
+                </a:effectLst>
               </a:rPr>
               <a:t>führen</a:t>
             </a:r>
@@ -7146,7 +7934,13 @@
                 <a:solidFill>
                   <a:srgbClr val="FFFFFF"/>
                 </a:solidFill>
-                <a:effectLst/>
+                <a:effectLst>
+                  <a:outerShdw blurRad="38100" dist="38100" dir="2700000" algn="tl">
+                    <a:srgbClr val="000000">
+                      <a:alpha val="43137"/>
+                    </a:srgbClr>
+                  </a:outerShdw>
+                </a:effectLst>
               </a:rPr>
               <a:t>.</a:t>
             </a:r>
@@ -7168,7 +7962,13 @@
                 <a:solidFill>
                   <a:srgbClr val="FFFFFF"/>
                 </a:solidFill>
-                <a:effectLst/>
+                <a:effectLst>
+                  <a:outerShdw blurRad="38100" dist="38100" dir="2700000" algn="tl">
+                    <a:srgbClr val="000000">
+                      <a:alpha val="43137"/>
+                    </a:srgbClr>
+                  </a:outerShdw>
+                </a:effectLst>
               </a:rPr>
               <a:t>Ungleichheiten</a:t>
             </a:r>
@@ -7177,7 +7977,13 @@
                 <a:solidFill>
                   <a:srgbClr val="FFFFFF"/>
                 </a:solidFill>
-                <a:effectLst/>
+                <a:effectLst>
+                  <a:outerShdw blurRad="38100" dist="38100" dir="2700000" algn="tl">
+                    <a:srgbClr val="000000">
+                      <a:alpha val="43137"/>
+                    </a:srgbClr>
+                  </a:outerShdw>
+                </a:effectLst>
               </a:rPr>
               <a:t> und </a:t>
             </a:r>
@@ -7186,7 +7992,13 @@
                 <a:solidFill>
                   <a:srgbClr val="FFFFFF"/>
                 </a:solidFill>
-                <a:effectLst/>
+                <a:effectLst>
+                  <a:outerShdw blurRad="38100" dist="38100" dir="2700000" algn="tl">
+                    <a:srgbClr val="000000">
+                      <a:alpha val="43137"/>
+                    </a:srgbClr>
+                  </a:outerShdw>
+                </a:effectLst>
               </a:rPr>
               <a:t>Zugang</a:t>
             </a:r>
@@ -7195,7 +8007,13 @@
                 <a:solidFill>
                   <a:srgbClr val="FFFFFF"/>
                 </a:solidFill>
-                <a:effectLst/>
+                <a:effectLst>
+                  <a:outerShdw blurRad="38100" dist="38100" dir="2700000" algn="tl">
+                    <a:srgbClr val="000000">
+                      <a:alpha val="43137"/>
+                    </a:srgbClr>
+                  </a:outerShdw>
+                </a:effectLst>
               </a:rPr>
               <a:t> </a:t>
             </a:r>
@@ -7204,7 +8022,13 @@
                 <a:solidFill>
                   <a:srgbClr val="FFFFFF"/>
                 </a:solidFill>
-                <a:effectLst/>
+                <a:effectLst>
+                  <a:outerShdw blurRad="38100" dist="38100" dir="2700000" algn="tl">
+                    <a:srgbClr val="000000">
+                      <a:alpha val="43137"/>
+                    </a:srgbClr>
+                  </a:outerShdw>
+                </a:effectLst>
               </a:rPr>
               <a:t>zur</a:t>
             </a:r>
@@ -7213,7 +8037,13 @@
                 <a:solidFill>
                   <a:srgbClr val="FFFFFF"/>
                 </a:solidFill>
-                <a:effectLst/>
+                <a:effectLst>
+                  <a:outerShdw blurRad="38100" dist="38100" dir="2700000" algn="tl">
+                    <a:srgbClr val="000000">
+                      <a:alpha val="43137"/>
+                    </a:srgbClr>
+                  </a:outerShdw>
+                </a:effectLst>
               </a:rPr>
               <a:t> </a:t>
             </a:r>
@@ -7222,7 +8052,13 @@
                 <a:solidFill>
                   <a:srgbClr val="FFFFFF"/>
                 </a:solidFill>
-                <a:effectLst/>
+                <a:effectLst>
+                  <a:outerShdw blurRad="38100" dist="38100" dir="2700000" algn="tl">
+                    <a:srgbClr val="000000">
+                      <a:alpha val="43137"/>
+                    </a:srgbClr>
+                  </a:outerShdw>
+                </a:effectLst>
               </a:rPr>
               <a:t>Technologie</a:t>
             </a:r>
@@ -7231,7 +8067,13 @@
                 <a:solidFill>
                   <a:srgbClr val="FFFFFF"/>
                 </a:solidFill>
-                <a:effectLst/>
+                <a:effectLst>
+                  <a:outerShdw blurRad="38100" dist="38100" dir="2700000" algn="tl">
+                    <a:srgbClr val="000000">
+                      <a:alpha val="43137"/>
+                    </a:srgbClr>
+                  </a:outerShdw>
+                </a:effectLst>
               </a:rPr>
               <a:t>: Die </a:t>
             </a:r>
@@ -7240,7 +8082,13 @@
                 <a:solidFill>
                   <a:srgbClr val="FFFFFF"/>
                 </a:solidFill>
-                <a:effectLst/>
+                <a:effectLst>
+                  <a:outerShdw blurRad="38100" dist="38100" dir="2700000" algn="tl">
+                    <a:srgbClr val="000000">
+                      <a:alpha val="43137"/>
+                    </a:srgbClr>
+                  </a:outerShdw>
+                </a:effectLst>
               </a:rPr>
               <a:t>Verfügbarkeit</a:t>
             </a:r>
@@ -7249,7 +8097,13 @@
                 <a:solidFill>
                   <a:srgbClr val="FFFFFF"/>
                 </a:solidFill>
-                <a:effectLst/>
+                <a:effectLst>
+                  <a:outerShdw blurRad="38100" dist="38100" dir="2700000" algn="tl">
+                    <a:srgbClr val="000000">
+                      <a:alpha val="43137"/>
+                    </a:srgbClr>
+                  </a:outerShdw>
+                </a:effectLst>
               </a:rPr>
               <a:t> von </a:t>
             </a:r>
@@ -7258,7 +8112,13 @@
                 <a:solidFill>
                   <a:srgbClr val="FFFFFF"/>
                 </a:solidFill>
-                <a:effectLst/>
+                <a:effectLst>
+                  <a:outerShdw blurRad="38100" dist="38100" dir="2700000" algn="tl">
+                    <a:srgbClr val="000000">
+                      <a:alpha val="43137"/>
+                    </a:srgbClr>
+                  </a:outerShdw>
+                </a:effectLst>
               </a:rPr>
               <a:t>Militärrobotern</a:t>
             </a:r>
@@ -7267,7 +8127,13 @@
                 <a:solidFill>
                   <a:srgbClr val="FFFFFF"/>
                 </a:solidFill>
-                <a:effectLst/>
+                <a:effectLst>
+                  <a:outerShdw blurRad="38100" dist="38100" dir="2700000" algn="tl">
+                    <a:srgbClr val="000000">
+                      <a:alpha val="43137"/>
+                    </a:srgbClr>
+                  </a:outerShdw>
+                </a:effectLst>
               </a:rPr>
               <a:t> </a:t>
             </a:r>
@@ -7276,7 +8142,13 @@
                 <a:solidFill>
                   <a:srgbClr val="FFFFFF"/>
                 </a:solidFill>
-                <a:effectLst/>
+                <a:effectLst>
+                  <a:outerShdw blurRad="38100" dist="38100" dir="2700000" algn="tl">
+                    <a:srgbClr val="000000">
+                      <a:alpha val="43137"/>
+                    </a:srgbClr>
+                  </a:outerShdw>
+                </a:effectLst>
               </a:rPr>
               <a:t>könnte</a:t>
             </a:r>
@@ -7285,7 +8157,13 @@
                 <a:solidFill>
                   <a:srgbClr val="FFFFFF"/>
                 </a:solidFill>
-                <a:effectLst/>
+                <a:effectLst>
+                  <a:outerShdw blurRad="38100" dist="38100" dir="2700000" algn="tl">
+                    <a:srgbClr val="000000">
+                      <a:alpha val="43137"/>
+                    </a:srgbClr>
+                  </a:outerShdw>
+                </a:effectLst>
               </a:rPr>
               <a:t> </a:t>
             </a:r>
@@ -7294,7 +8172,13 @@
                 <a:solidFill>
                   <a:srgbClr val="FFFFFF"/>
                 </a:solidFill>
-                <a:effectLst/>
+                <a:effectLst>
+                  <a:outerShdw blurRad="38100" dist="38100" dir="2700000" algn="tl">
+                    <a:srgbClr val="000000">
+                      <a:alpha val="43137"/>
+                    </a:srgbClr>
+                  </a:outerShdw>
+                </a:effectLst>
               </a:rPr>
               <a:t>bestehende</a:t>
             </a:r>
@@ -7303,7 +8187,13 @@
                 <a:solidFill>
                   <a:srgbClr val="FFFFFF"/>
                 </a:solidFill>
-                <a:effectLst/>
+                <a:effectLst>
+                  <a:outerShdw blurRad="38100" dist="38100" dir="2700000" algn="tl">
+                    <a:srgbClr val="000000">
+                      <a:alpha val="43137"/>
+                    </a:srgbClr>
+                  </a:outerShdw>
+                </a:effectLst>
               </a:rPr>
               <a:t> </a:t>
             </a:r>
@@ -7312,7 +8202,13 @@
                 <a:solidFill>
                   <a:srgbClr val="FFFFFF"/>
                 </a:solidFill>
-                <a:effectLst/>
+                <a:effectLst>
+                  <a:outerShdw blurRad="38100" dist="38100" dir="2700000" algn="tl">
+                    <a:srgbClr val="000000">
+                      <a:alpha val="43137"/>
+                    </a:srgbClr>
+                  </a:outerShdw>
+                </a:effectLst>
               </a:rPr>
               <a:t>Ungleichheiten</a:t>
             </a:r>
@@ -7321,7 +8217,13 @@
                 <a:solidFill>
                   <a:srgbClr val="FFFFFF"/>
                 </a:solidFill>
-                <a:effectLst/>
+                <a:effectLst>
+                  <a:outerShdw blurRad="38100" dist="38100" dir="2700000" algn="tl">
+                    <a:srgbClr val="000000">
+                      <a:alpha val="43137"/>
+                    </a:srgbClr>
+                  </a:outerShdw>
+                </a:effectLst>
               </a:rPr>
               <a:t> </a:t>
             </a:r>
@@ -7330,7 +8232,13 @@
                 <a:solidFill>
                   <a:srgbClr val="FFFFFF"/>
                 </a:solidFill>
-                <a:effectLst/>
+                <a:effectLst>
+                  <a:outerShdw blurRad="38100" dist="38100" dir="2700000" algn="tl">
+                    <a:srgbClr val="000000">
+                      <a:alpha val="43137"/>
+                    </a:srgbClr>
+                  </a:outerShdw>
+                </a:effectLst>
               </a:rPr>
               <a:t>verstärken</a:t>
             </a:r>
@@ -7339,7 +8247,13 @@
                 <a:solidFill>
                   <a:srgbClr val="FFFFFF"/>
                 </a:solidFill>
-                <a:effectLst/>
+                <a:effectLst>
+                  <a:outerShdw blurRad="38100" dist="38100" dir="2700000" algn="tl">
+                    <a:srgbClr val="000000">
+                      <a:alpha val="43137"/>
+                    </a:srgbClr>
+                  </a:outerShdw>
+                </a:effectLst>
               </a:rPr>
               <a:t>.</a:t>
             </a:r>
@@ -7361,7 +8275,13 @@
                 <a:solidFill>
                   <a:srgbClr val="FFFFFF"/>
                 </a:solidFill>
-                <a:effectLst/>
+                <a:effectLst>
+                  <a:outerShdw blurRad="38100" dist="38100" dir="2700000" algn="tl">
+                    <a:srgbClr val="000000">
+                      <a:alpha val="43137"/>
+                    </a:srgbClr>
+                  </a:outerShdw>
+                </a:effectLst>
               </a:rPr>
               <a:t>Vertrauen</a:t>
             </a:r>
@@ -7370,7 +8290,13 @@
                 <a:solidFill>
                   <a:srgbClr val="FFFFFF"/>
                 </a:solidFill>
-                <a:effectLst/>
+                <a:effectLst>
+                  <a:outerShdw blurRad="38100" dist="38100" dir="2700000" algn="tl">
+                    <a:srgbClr val="000000">
+                      <a:alpha val="43137"/>
+                    </a:srgbClr>
+                  </a:outerShdw>
+                </a:effectLst>
               </a:rPr>
               <a:t> in </a:t>
             </a:r>
@@ -7379,7 +8305,13 @@
                 <a:solidFill>
                   <a:srgbClr val="FFFFFF"/>
                 </a:solidFill>
-                <a:effectLst/>
+                <a:effectLst>
+                  <a:outerShdw blurRad="38100" dist="38100" dir="2700000" algn="tl">
+                    <a:srgbClr val="000000">
+                      <a:alpha val="43137"/>
+                    </a:srgbClr>
+                  </a:outerShdw>
+                </a:effectLst>
               </a:rPr>
               <a:t>Technologie</a:t>
             </a:r>
@@ -7388,7 +8320,13 @@
                 <a:solidFill>
                   <a:srgbClr val="FFFFFF"/>
                 </a:solidFill>
-                <a:effectLst/>
+                <a:effectLst>
+                  <a:outerShdw blurRad="38100" dist="38100" dir="2700000" algn="tl">
+                    <a:srgbClr val="000000">
+                      <a:alpha val="43137"/>
+                    </a:srgbClr>
+                  </a:outerShdw>
+                </a:effectLst>
               </a:rPr>
               <a:t> und </a:t>
             </a:r>
@@ -7397,7 +8335,13 @@
                 <a:solidFill>
                   <a:srgbClr val="FFFFFF"/>
                 </a:solidFill>
-                <a:effectLst/>
+                <a:effectLst>
+                  <a:outerShdw blurRad="38100" dist="38100" dir="2700000" algn="tl">
+                    <a:srgbClr val="000000">
+                      <a:alpha val="43137"/>
+                    </a:srgbClr>
+                  </a:outerShdw>
+                </a:effectLst>
               </a:rPr>
               <a:t>Regierungen</a:t>
             </a:r>
@@ -7406,7 +8350,13 @@
                 <a:solidFill>
                   <a:srgbClr val="FFFFFF"/>
                 </a:solidFill>
-                <a:effectLst/>
+                <a:effectLst>
+                  <a:outerShdw blurRad="38100" dist="38100" dir="2700000" algn="tl">
+                    <a:srgbClr val="000000">
+                      <a:alpha val="43137"/>
+                    </a:srgbClr>
+                  </a:outerShdw>
+                </a:effectLst>
               </a:rPr>
               <a:t>: Die </a:t>
             </a:r>
@@ -7415,7 +8365,13 @@
                 <a:solidFill>
                   <a:srgbClr val="FFFFFF"/>
                 </a:solidFill>
-                <a:effectLst/>
+                <a:effectLst>
+                  <a:outerShdw blurRad="38100" dist="38100" dir="2700000" algn="tl">
+                    <a:srgbClr val="000000">
+                      <a:alpha val="43137"/>
+                    </a:srgbClr>
+                  </a:outerShdw>
+                </a:effectLst>
               </a:rPr>
               <a:t>Nutzung</a:t>
             </a:r>
@@ -7424,7 +8380,13 @@
                 <a:solidFill>
                   <a:srgbClr val="FFFFFF"/>
                 </a:solidFill>
-                <a:effectLst/>
+                <a:effectLst>
+                  <a:outerShdw blurRad="38100" dist="38100" dir="2700000" algn="tl">
+                    <a:srgbClr val="000000">
+                      <a:alpha val="43137"/>
+                    </a:srgbClr>
+                  </a:outerShdw>
+                </a:effectLst>
               </a:rPr>
               <a:t> von </a:t>
             </a:r>
@@ -7433,7 +8395,13 @@
                 <a:solidFill>
                   <a:srgbClr val="FFFFFF"/>
                 </a:solidFill>
-                <a:effectLst/>
+                <a:effectLst>
+                  <a:outerShdw blurRad="38100" dist="38100" dir="2700000" algn="tl">
+                    <a:srgbClr val="000000">
+                      <a:alpha val="43137"/>
+                    </a:srgbClr>
+                  </a:outerShdw>
+                </a:effectLst>
               </a:rPr>
               <a:t>Militärrobotern</a:t>
             </a:r>
@@ -7442,7 +8410,13 @@
                 <a:solidFill>
                   <a:srgbClr val="FFFFFF"/>
                 </a:solidFill>
-                <a:effectLst/>
+                <a:effectLst>
+                  <a:outerShdw blurRad="38100" dist="38100" dir="2700000" algn="tl">
+                    <a:srgbClr val="000000">
+                      <a:alpha val="43137"/>
+                    </a:srgbClr>
+                  </a:outerShdw>
+                </a:effectLst>
               </a:rPr>
               <a:t> </a:t>
             </a:r>
@@ -7451,7 +8425,13 @@
                 <a:solidFill>
                   <a:srgbClr val="FFFFFF"/>
                 </a:solidFill>
-                <a:effectLst/>
+                <a:effectLst>
+                  <a:outerShdw blurRad="38100" dist="38100" dir="2700000" algn="tl">
+                    <a:srgbClr val="000000">
+                      <a:alpha val="43137"/>
+                    </a:srgbClr>
+                  </a:outerShdw>
+                </a:effectLst>
               </a:rPr>
               <a:t>könnte</a:t>
             </a:r>
@@ -7460,7 +8440,13 @@
                 <a:solidFill>
                   <a:srgbClr val="FFFFFF"/>
                 </a:solidFill>
-                <a:effectLst/>
+                <a:effectLst>
+                  <a:outerShdw blurRad="38100" dist="38100" dir="2700000" algn="tl">
+                    <a:srgbClr val="000000">
+                      <a:alpha val="43137"/>
+                    </a:srgbClr>
+                  </a:outerShdw>
+                </a:effectLst>
               </a:rPr>
               <a:t> das </a:t>
             </a:r>
@@ -7469,7 +8455,13 @@
                 <a:solidFill>
                   <a:srgbClr val="FFFFFF"/>
                 </a:solidFill>
-                <a:effectLst/>
+                <a:effectLst>
+                  <a:outerShdw blurRad="38100" dist="38100" dir="2700000" algn="tl">
+                    <a:srgbClr val="000000">
+                      <a:alpha val="43137"/>
+                    </a:srgbClr>
+                  </a:outerShdw>
+                </a:effectLst>
               </a:rPr>
               <a:t>Vertrauen</a:t>
             </a:r>
@@ -7478,7 +8470,13 @@
                 <a:solidFill>
                   <a:srgbClr val="FFFFFF"/>
                 </a:solidFill>
-                <a:effectLst/>
+                <a:effectLst>
+                  <a:outerShdw blurRad="38100" dist="38100" dir="2700000" algn="tl">
+                    <a:srgbClr val="000000">
+                      <a:alpha val="43137"/>
+                    </a:srgbClr>
+                  </a:outerShdw>
+                </a:effectLst>
               </a:rPr>
               <a:t> in </a:t>
             </a:r>
@@ -7487,7 +8485,13 @@
                 <a:solidFill>
                   <a:srgbClr val="FFFFFF"/>
                 </a:solidFill>
-                <a:effectLst/>
+                <a:effectLst>
+                  <a:outerShdw blurRad="38100" dist="38100" dir="2700000" algn="tl">
+                    <a:srgbClr val="000000">
+                      <a:alpha val="43137"/>
+                    </a:srgbClr>
+                  </a:outerShdw>
+                </a:effectLst>
               </a:rPr>
               <a:t>Technologie</a:t>
             </a:r>
@@ -7496,7 +8500,13 @@
                 <a:solidFill>
                   <a:srgbClr val="FFFFFF"/>
                 </a:solidFill>
-                <a:effectLst/>
+                <a:effectLst>
+                  <a:outerShdw blurRad="38100" dist="38100" dir="2700000" algn="tl">
+                    <a:srgbClr val="000000">
+                      <a:alpha val="43137"/>
+                    </a:srgbClr>
+                  </a:outerShdw>
+                </a:effectLst>
               </a:rPr>
               <a:t> und </a:t>
             </a:r>
@@ -7505,7 +8515,13 @@
                 <a:solidFill>
                   <a:srgbClr val="FFFFFF"/>
                 </a:solidFill>
-                <a:effectLst/>
+                <a:effectLst>
+                  <a:outerShdw blurRad="38100" dist="38100" dir="2700000" algn="tl">
+                    <a:srgbClr val="000000">
+                      <a:alpha val="43137"/>
+                    </a:srgbClr>
+                  </a:outerShdw>
+                </a:effectLst>
               </a:rPr>
               <a:t>Regierungen</a:t>
             </a:r>
@@ -7514,7 +8530,13 @@
                 <a:solidFill>
                   <a:srgbClr val="FFFFFF"/>
                 </a:solidFill>
-                <a:effectLst/>
+                <a:effectLst>
+                  <a:outerShdw blurRad="38100" dist="38100" dir="2700000" algn="tl">
+                    <a:srgbClr val="000000">
+                      <a:alpha val="43137"/>
+                    </a:srgbClr>
+                  </a:outerShdw>
+                </a:effectLst>
               </a:rPr>
               <a:t> </a:t>
             </a:r>
@@ -7523,7 +8545,13 @@
                 <a:solidFill>
                   <a:srgbClr val="FFFFFF"/>
                 </a:solidFill>
-                <a:effectLst/>
+                <a:effectLst>
+                  <a:outerShdw blurRad="38100" dist="38100" dir="2700000" algn="tl">
+                    <a:srgbClr val="000000">
+                      <a:alpha val="43137"/>
+                    </a:srgbClr>
+                  </a:outerShdw>
+                </a:effectLst>
               </a:rPr>
               <a:t>beeinflussen</a:t>
             </a:r>
@@ -7532,7 +8560,13 @@
                 <a:solidFill>
                   <a:srgbClr val="FFFFFF"/>
                 </a:solidFill>
-                <a:effectLst/>
+                <a:effectLst>
+                  <a:outerShdw blurRad="38100" dist="38100" dir="2700000" algn="tl">
+                    <a:srgbClr val="000000">
+                      <a:alpha val="43137"/>
+                    </a:srgbClr>
+                  </a:outerShdw>
+                </a:effectLst>
               </a:rPr>
               <a:t>.</a:t>
             </a:r>

</xml_diff>